<commit_message>
New version of regex.pptx
Corrected typo
</commit_message>
<xml_diff>
--- a/powerpoints/regex.pptx
+++ b/powerpoints/regex.pptx
@@ -86,6 +86,22 @@
       </a:defRPr>
     </a:lvl9pPr>
   </p:defaultTextStyle>
+  <p:extLst>
+    <p:ext uri="{EFAFB233-063F-42B5-8137-9DF3F51BA10A}">
+      <p15:sldGuideLst xmlns:p15="http://schemas.microsoft.com/office/powerpoint/2012/main">
+        <p15:guide id="1" orient="horz" pos="3400">
+          <p15:clr>
+            <a:srgbClr val="A4A3A4"/>
+          </p15:clr>
+        </p15:guide>
+        <p15:guide id="2" pos="4400">
+          <p15:clr>
+            <a:srgbClr val="A4A3A4"/>
+          </p15:clr>
+        </p15:guide>
+      </p15:sldGuideLst>
+    </p:ext>
+  </p:extLst>
 </p:presentation>
 </file>
 
@@ -1426,7 +1442,7 @@
           </a:ln>
           <a:extLst>
             <a:ext uri="{C572A759-6A51-4108-AA02-DFA0A04FC94B}">
-              <ma14:wrappingTextBoxFlag xmlns:ma14="http://schemas.microsoft.com/office/mac/drawingml/2011/main" xmlns="" val="1"/>
+              <ma14:wrappingTextBoxFlag xmlns="" xmlns:ma14="http://schemas.microsoft.com/office/mac/drawingml/2011/main" val="1"/>
             </a:ext>
           </a:extLst>
         </p:spPr>
@@ -1469,7 +1485,7 @@
           </a:ln>
           <a:extLst>
             <a:ext uri="{C572A759-6A51-4108-AA02-DFA0A04FC94B}">
-              <ma14:wrappingTextBoxFlag xmlns:ma14="http://schemas.microsoft.com/office/mac/drawingml/2011/main" xmlns="" val="1"/>
+              <ma14:wrappingTextBoxFlag xmlns="" xmlns:ma14="http://schemas.microsoft.com/office/mac/drawingml/2011/main" val="1"/>
             </a:ext>
           </a:extLst>
         </p:spPr>
@@ -2028,7 +2044,7 @@
           </a:ln>
           <a:extLst>
             <a:ext uri="{C572A759-6A51-4108-AA02-DFA0A04FC94B}">
-              <ma14:wrappingTextBoxFlag xmlns:ma14="http://schemas.microsoft.com/office/mac/drawingml/2011/main" xmlns="" val="1"/>
+              <ma14:wrappingTextBoxFlag xmlns="" xmlns:ma14="http://schemas.microsoft.com/office/mac/drawingml/2011/main" val="1"/>
             </a:ext>
           </a:extLst>
         </p:spPr>
@@ -2069,7 +2085,7 @@
                 <a:cs typeface="Source Sans Pro Light"/>
                 <a:sym typeface="Source Sans Pro Light"/>
               </a:rPr>
-              <a:t>10</a:t>
+              <a:t>07</a:t>
             </a:r>
             <a:r>
               <a:rPr sz="900" dirty="0" smtClean="0">
@@ -2081,13 +2097,13 @@
               <a:t>/</a:t>
             </a:r>
             <a:r>
-              <a:rPr lang="de-DE" sz="900" dirty="0" smtClean="0">
+              <a:rPr lang="de-DE" sz="900" smtClean="0">
                 <a:latin typeface="Source Sans Pro Light"/>
                 <a:ea typeface="Source Sans Pro Light"/>
                 <a:cs typeface="Source Sans Pro Light"/>
                 <a:sym typeface="Source Sans Pro Light"/>
               </a:rPr>
-              <a:t>18</a:t>
+              <a:t>19</a:t>
             </a:r>
             <a:endParaRPr sz="900" dirty="0">
               <a:latin typeface="Source Sans Pro Light"/>
@@ -2218,7 +2234,7 @@
             </a:ln>
             <a:extLst>
               <a:ext uri="{C572A759-6A51-4108-AA02-DFA0A04FC94B}">
-                <ma14:wrappingTextBoxFlag xmlns:ma14="http://schemas.microsoft.com/office/mac/drawingml/2011/main" xmlns="" val="1"/>
+                <ma14:wrappingTextBoxFlag xmlns="" xmlns:ma14="http://schemas.microsoft.com/office/mac/drawingml/2011/main" val="1"/>
               </a:ext>
             </a:extLst>
           </p:spPr>
@@ -2276,8 +2292,20 @@
                   <a:tableStyleId>{33BA23B1-9221-436E-865A-0063620EA4FD}</a:tableStyleId>
                 </a:tblPr>
                 <a:tblGrid>
-                  <a:gridCol w="537703"/>
-                  <a:gridCol w="2628818"/>
+                  <a:gridCol w="537703">
+                    <a:extLst>
+                      <a:ext uri="{9D8B030D-6E8A-4147-A177-3AD203B41FA5}">
+                        <a16:colId xmlns:a16="http://schemas.microsoft.com/office/drawing/2014/main" val="20000"/>
+                      </a:ext>
+                    </a:extLst>
+                  </a:gridCol>
+                  <a:gridCol w="2628818">
+                    <a:extLst>
+                      <a:ext uri="{9D8B030D-6E8A-4147-A177-3AD203B41FA5}">
+                        <a16:colId xmlns:a16="http://schemas.microsoft.com/office/drawing/2014/main" val="20001"/>
+                      </a:ext>
+                    </a:extLst>
+                  </a:gridCol>
                 </a:tblGrid>
                 <a:tr h="0">
                   <a:tc>
@@ -2352,6 +2380,11 @@
                       </a:solidFill>
                     </a:tcPr>
                   </a:tc>
+                  <a:extLst>
+                    <a:ext uri="{0D108BD9-81ED-4DB2-BD59-A6C34878D82A}">
+                      <a16:rowId xmlns:a16="http://schemas.microsoft.com/office/drawing/2014/main" val="10000"/>
+                    </a:ext>
+                  </a:extLst>
                 </a:tr>
                 <a:tr h="0">
                   <a:tc>
@@ -2449,6 +2482,11 @@
                       </a:solidFill>
                     </a:tcPr>
                   </a:tc>
+                  <a:extLst>
+                    <a:ext uri="{0D108BD9-81ED-4DB2-BD59-A6C34878D82A}">
+                      <a16:rowId xmlns:a16="http://schemas.microsoft.com/office/drawing/2014/main" val="10001"/>
+                    </a:ext>
+                  </a:extLst>
                 </a:tr>
                 <a:tr h="0">
                   <a:tc>
@@ -2545,6 +2583,11 @@
                       </a:solidFill>
                     </a:tcPr>
                   </a:tc>
+                  <a:extLst>
+                    <a:ext uri="{0D108BD9-81ED-4DB2-BD59-A6C34878D82A}">
+                      <a16:rowId xmlns:a16="http://schemas.microsoft.com/office/drawing/2014/main" val="10002"/>
+                    </a:ext>
+                  </a:extLst>
                 </a:tr>
                 <a:tr h="0">
                   <a:tc>
@@ -2653,6 +2696,11 @@
                       </a:solidFill>
                     </a:tcPr>
                   </a:tc>
+                  <a:extLst>
+                    <a:ext uri="{0D108BD9-81ED-4DB2-BD59-A6C34878D82A}">
+                      <a16:rowId xmlns:a16="http://schemas.microsoft.com/office/drawing/2014/main" val="10003"/>
+                    </a:ext>
+                  </a:extLst>
                 </a:tr>
                 <a:tr h="0">
                   <a:tc>
@@ -2727,6 +2775,11 @@
                       </a:solidFill>
                     </a:tcPr>
                   </a:tc>
+                  <a:extLst>
+                    <a:ext uri="{0D108BD9-81ED-4DB2-BD59-A6C34878D82A}">
+                      <a16:rowId xmlns:a16="http://schemas.microsoft.com/office/drawing/2014/main" val="10004"/>
+                    </a:ext>
+                  </a:extLst>
                 </a:tr>
                 <a:tr h="0">
                   <a:tc>
@@ -2827,6 +2880,11 @@
                       </a:solidFill>
                     </a:tcPr>
                   </a:tc>
+                  <a:extLst>
+                    <a:ext uri="{0D108BD9-81ED-4DB2-BD59-A6C34878D82A}">
+                      <a16:rowId xmlns:a16="http://schemas.microsoft.com/office/drawing/2014/main" val="10005"/>
+                    </a:ext>
+                  </a:extLst>
                 </a:tr>
               </a:tbl>
             </a:graphicData>
@@ -2857,7 +2915,7 @@
           </a:ln>
           <a:extLst>
             <a:ext uri="{C572A759-6A51-4108-AA02-DFA0A04FC94B}">
-              <ma14:wrappingTextBoxFlag xmlns:ma14="http://schemas.microsoft.com/office/mac/drawingml/2011/main" xmlns="" val="1"/>
+              <ma14:wrappingTextBoxFlag xmlns="" xmlns:ma14="http://schemas.microsoft.com/office/mac/drawingml/2011/main" val="1"/>
             </a:ext>
           </a:extLst>
         </p:spPr>
@@ -6183,14 +6241,62 @@
                   <a:tableStyleId>{33BA23B1-9221-436E-865A-0063620EA4FD}</a:tableStyleId>
                 </a:tblPr>
                 <a:tblGrid>
-                  <a:gridCol w="302367"/>
-                  <a:gridCol w="302367"/>
-                  <a:gridCol w="302367"/>
-                  <a:gridCol w="302367"/>
-                  <a:gridCol w="302367"/>
-                  <a:gridCol w="302367"/>
-                  <a:gridCol w="302367"/>
-                  <a:gridCol w="302367"/>
+                  <a:gridCol w="302367">
+                    <a:extLst>
+                      <a:ext uri="{9D8B030D-6E8A-4147-A177-3AD203B41FA5}">
+                        <a16:colId xmlns:a16="http://schemas.microsoft.com/office/drawing/2014/main" val="20000"/>
+                      </a:ext>
+                    </a:extLst>
+                  </a:gridCol>
+                  <a:gridCol w="302367">
+                    <a:extLst>
+                      <a:ext uri="{9D8B030D-6E8A-4147-A177-3AD203B41FA5}">
+                        <a16:colId xmlns:a16="http://schemas.microsoft.com/office/drawing/2014/main" val="20001"/>
+                      </a:ext>
+                    </a:extLst>
+                  </a:gridCol>
+                  <a:gridCol w="302367">
+                    <a:extLst>
+                      <a:ext uri="{9D8B030D-6E8A-4147-A177-3AD203B41FA5}">
+                        <a16:colId xmlns:a16="http://schemas.microsoft.com/office/drawing/2014/main" val="20002"/>
+                      </a:ext>
+                    </a:extLst>
+                  </a:gridCol>
+                  <a:gridCol w="302367">
+                    <a:extLst>
+                      <a:ext uri="{9D8B030D-6E8A-4147-A177-3AD203B41FA5}">
+                        <a16:colId xmlns:a16="http://schemas.microsoft.com/office/drawing/2014/main" val="20003"/>
+                      </a:ext>
+                    </a:extLst>
+                  </a:gridCol>
+                  <a:gridCol w="302367">
+                    <a:extLst>
+                      <a:ext uri="{9D8B030D-6E8A-4147-A177-3AD203B41FA5}">
+                        <a16:colId xmlns:a16="http://schemas.microsoft.com/office/drawing/2014/main" val="20004"/>
+                      </a:ext>
+                    </a:extLst>
+                  </a:gridCol>
+                  <a:gridCol w="302367">
+                    <a:extLst>
+                      <a:ext uri="{9D8B030D-6E8A-4147-A177-3AD203B41FA5}">
+                        <a16:colId xmlns:a16="http://schemas.microsoft.com/office/drawing/2014/main" val="20005"/>
+                      </a:ext>
+                    </a:extLst>
+                  </a:gridCol>
+                  <a:gridCol w="302367">
+                    <a:extLst>
+                      <a:ext uri="{9D8B030D-6E8A-4147-A177-3AD203B41FA5}">
+                        <a16:colId xmlns:a16="http://schemas.microsoft.com/office/drawing/2014/main" val="20006"/>
+                      </a:ext>
+                    </a:extLst>
+                  </a:gridCol>
+                  <a:gridCol w="302367">
+                    <a:extLst>
+                      <a:ext uri="{9D8B030D-6E8A-4147-A177-3AD203B41FA5}">
+                        <a16:colId xmlns:a16="http://schemas.microsoft.com/office/drawing/2014/main" val="20007"/>
+                      </a:ext>
+                    </a:extLst>
+                  </a:gridCol>
                 </a:tblGrid>
                 <a:tr h="248620">
                   <a:tc>
@@ -6360,6 +6466,11 @@
                       </a:solidFill>
                     </a:tcPr>
                   </a:tc>
+                  <a:extLst>
+                    <a:ext uri="{0D108BD9-81ED-4DB2-BD59-A6C34878D82A}">
+                      <a16:rowId xmlns:a16="http://schemas.microsoft.com/office/drawing/2014/main" val="10000"/>
+                    </a:ext>
+                  </a:extLst>
                 </a:tr>
               </a:tbl>
             </a:graphicData>
@@ -7027,14 +7138,62 @@
                 <a:tableStyleId>{33BA23B1-9221-436E-865A-0063620EA4FD}</a:tableStyleId>
               </a:tblPr>
               <a:tblGrid>
-                <a:gridCol w="226334"/>
-                <a:gridCol w="226334"/>
-                <a:gridCol w="226334"/>
-                <a:gridCol w="226334"/>
-                <a:gridCol w="226334"/>
-                <a:gridCol w="226334"/>
-                <a:gridCol w="226334"/>
-                <a:gridCol w="226334"/>
+                <a:gridCol w="226334">
+                  <a:extLst>
+                    <a:ext uri="{9D8B030D-6E8A-4147-A177-3AD203B41FA5}">
+                      <a16:colId xmlns:a16="http://schemas.microsoft.com/office/drawing/2014/main" val="20000"/>
+                    </a:ext>
+                  </a:extLst>
+                </a:gridCol>
+                <a:gridCol w="226334">
+                  <a:extLst>
+                    <a:ext uri="{9D8B030D-6E8A-4147-A177-3AD203B41FA5}">
+                      <a16:colId xmlns:a16="http://schemas.microsoft.com/office/drawing/2014/main" val="20001"/>
+                    </a:ext>
+                  </a:extLst>
+                </a:gridCol>
+                <a:gridCol w="226334">
+                  <a:extLst>
+                    <a:ext uri="{9D8B030D-6E8A-4147-A177-3AD203B41FA5}">
+                      <a16:colId xmlns:a16="http://schemas.microsoft.com/office/drawing/2014/main" val="20002"/>
+                    </a:ext>
+                  </a:extLst>
+                </a:gridCol>
+                <a:gridCol w="226334">
+                  <a:extLst>
+                    <a:ext uri="{9D8B030D-6E8A-4147-A177-3AD203B41FA5}">
+                      <a16:colId xmlns:a16="http://schemas.microsoft.com/office/drawing/2014/main" val="20003"/>
+                    </a:ext>
+                  </a:extLst>
+                </a:gridCol>
+                <a:gridCol w="226334">
+                  <a:extLst>
+                    <a:ext uri="{9D8B030D-6E8A-4147-A177-3AD203B41FA5}">
+                      <a16:colId xmlns:a16="http://schemas.microsoft.com/office/drawing/2014/main" val="20004"/>
+                    </a:ext>
+                  </a:extLst>
+                </a:gridCol>
+                <a:gridCol w="226334">
+                  <a:extLst>
+                    <a:ext uri="{9D8B030D-6E8A-4147-A177-3AD203B41FA5}">
+                      <a16:colId xmlns:a16="http://schemas.microsoft.com/office/drawing/2014/main" val="20005"/>
+                    </a:ext>
+                  </a:extLst>
+                </a:gridCol>
+                <a:gridCol w="226334">
+                  <a:extLst>
+                    <a:ext uri="{9D8B030D-6E8A-4147-A177-3AD203B41FA5}">
+                      <a16:colId xmlns:a16="http://schemas.microsoft.com/office/drawing/2014/main" val="20006"/>
+                    </a:ext>
+                  </a:extLst>
+                </a:gridCol>
+                <a:gridCol w="226334">
+                  <a:extLst>
+                    <a:ext uri="{9D8B030D-6E8A-4147-A177-3AD203B41FA5}">
+                      <a16:colId xmlns:a16="http://schemas.microsoft.com/office/drawing/2014/main" val="20007"/>
+                    </a:ext>
+                  </a:extLst>
+                </a:gridCol>
               </a:tblGrid>
               <a:tr h="0">
                 <a:tc>
@@ -7213,6 +7372,11 @@
                     </a:solidFill>
                   </a:tcPr>
                 </a:tc>
+                <a:extLst>
+                  <a:ext uri="{0D108BD9-81ED-4DB2-BD59-A6C34878D82A}">
+                    <a16:rowId xmlns:a16="http://schemas.microsoft.com/office/drawing/2014/main" val="10000"/>
+                  </a:ext>
+                </a:extLst>
               </a:tr>
             </a:tbl>
           </a:graphicData>
@@ -7241,9 +7405,27 @@
                 <a:tableStyleId>{33BA23B1-9221-436E-865A-0063620EA4FD}</a:tableStyleId>
               </a:tblPr>
               <a:tblGrid>
-                <a:gridCol w="226334"/>
-                <a:gridCol w="226334"/>
-                <a:gridCol w="226334"/>
+                <a:gridCol w="226334">
+                  <a:extLst>
+                    <a:ext uri="{9D8B030D-6E8A-4147-A177-3AD203B41FA5}">
+                      <a16:colId xmlns:a16="http://schemas.microsoft.com/office/drawing/2014/main" val="20000"/>
+                    </a:ext>
+                  </a:extLst>
+                </a:gridCol>
+                <a:gridCol w="226334">
+                  <a:extLst>
+                    <a:ext uri="{9D8B030D-6E8A-4147-A177-3AD203B41FA5}">
+                      <a16:colId xmlns:a16="http://schemas.microsoft.com/office/drawing/2014/main" val="20001"/>
+                    </a:ext>
+                  </a:extLst>
+                </a:gridCol>
+                <a:gridCol w="226334">
+                  <a:extLst>
+                    <a:ext uri="{9D8B030D-6E8A-4147-A177-3AD203B41FA5}">
+                      <a16:colId xmlns:a16="http://schemas.microsoft.com/office/drawing/2014/main" val="20002"/>
+                    </a:ext>
+                  </a:extLst>
+                </a:gridCol>
               </a:tblGrid>
               <a:tr h="0">
                 <a:tc>
@@ -7303,6 +7485,11 @@
                     </a:solidFill>
                   </a:tcPr>
                 </a:tc>
+                <a:extLst>
+                  <a:ext uri="{0D108BD9-81ED-4DB2-BD59-A6C34878D82A}">
+                    <a16:rowId xmlns:a16="http://schemas.microsoft.com/office/drawing/2014/main" val="10000"/>
+                  </a:ext>
+                </a:extLst>
               </a:tr>
             </a:tbl>
           </a:graphicData>
@@ -7585,7 +7772,7 @@
             </a:ln>
             <a:extLst>
               <a:ext uri="{C572A759-6A51-4108-AA02-DFA0A04FC94B}">
-                <ma14:wrappingTextBoxFlag xmlns:ma14="http://schemas.microsoft.com/office/mac/drawingml/2011/main" xmlns="" val="1"/>
+                <ma14:wrappingTextBoxFlag xmlns="" xmlns:ma14="http://schemas.microsoft.com/office/mac/drawingml/2011/main" val="1"/>
               </a:ext>
             </a:extLst>
           </p:spPr>
@@ -7643,8 +7830,20 @@
                   <a:tableStyleId>{33BA23B1-9221-436E-865A-0063620EA4FD}</a:tableStyleId>
                 </a:tblPr>
                 <a:tblGrid>
-                  <a:gridCol w="537703"/>
-                  <a:gridCol w="2628818"/>
+                  <a:gridCol w="537703">
+                    <a:extLst>
+                      <a:ext uri="{9D8B030D-6E8A-4147-A177-3AD203B41FA5}">
+                        <a16:colId xmlns:a16="http://schemas.microsoft.com/office/drawing/2014/main" val="20000"/>
+                      </a:ext>
+                    </a:extLst>
+                  </a:gridCol>
+                  <a:gridCol w="2628818">
+                    <a:extLst>
+                      <a:ext uri="{9D8B030D-6E8A-4147-A177-3AD203B41FA5}">
+                        <a16:colId xmlns:a16="http://schemas.microsoft.com/office/drawing/2014/main" val="20001"/>
+                      </a:ext>
+                    </a:extLst>
+                  </a:gridCol>
                 </a:tblGrid>
                 <a:tr h="0">
                   <a:tc>
@@ -7705,6 +7904,11 @@
                       </a:solidFill>
                     </a:tcPr>
                   </a:tc>
+                  <a:extLst>
+                    <a:ext uri="{0D108BD9-81ED-4DB2-BD59-A6C34878D82A}">
+                      <a16:rowId xmlns:a16="http://schemas.microsoft.com/office/drawing/2014/main" val="10000"/>
+                    </a:ext>
+                  </a:extLst>
                 </a:tr>
                 <a:tr h="0">
                   <a:tc>
@@ -7769,6 +7973,11 @@
                       </a:solidFill>
                     </a:tcPr>
                   </a:tc>
+                  <a:extLst>
+                    <a:ext uri="{0D108BD9-81ED-4DB2-BD59-A6C34878D82A}">
+                      <a16:rowId xmlns:a16="http://schemas.microsoft.com/office/drawing/2014/main" val="10001"/>
+                    </a:ext>
+                  </a:extLst>
                 </a:tr>
                 <a:tr h="0">
                   <a:tc>
@@ -7837,6 +8046,11 @@
                       </a:solidFill>
                     </a:tcPr>
                   </a:tc>
+                  <a:extLst>
+                    <a:ext uri="{0D108BD9-81ED-4DB2-BD59-A6C34878D82A}">
+                      <a16:rowId xmlns:a16="http://schemas.microsoft.com/office/drawing/2014/main" val="10002"/>
+                    </a:ext>
+                  </a:extLst>
                 </a:tr>
                 <a:tr h="0">
                   <a:tc>
@@ -7997,6 +8211,11 @@
                       </a:solidFill>
                     </a:tcPr>
                   </a:tc>
+                  <a:extLst>
+                    <a:ext uri="{0D108BD9-81ED-4DB2-BD59-A6C34878D82A}">
+                      <a16:rowId xmlns:a16="http://schemas.microsoft.com/office/drawing/2014/main" val="10003"/>
+                    </a:ext>
+                  </a:extLst>
                 </a:tr>
                 <a:tr h="0">
                   <a:tc>
@@ -8065,6 +8284,11 @@
                       </a:solidFill>
                     </a:tcPr>
                   </a:tc>
+                  <a:extLst>
+                    <a:ext uri="{0D108BD9-81ED-4DB2-BD59-A6C34878D82A}">
+                      <a16:rowId xmlns:a16="http://schemas.microsoft.com/office/drawing/2014/main" val="10004"/>
+                    </a:ext>
+                  </a:extLst>
                 </a:tr>
                 <a:tr h="0">
                   <a:tc>
@@ -8137,6 +8361,11 @@
                       </a:solidFill>
                     </a:tcPr>
                   </a:tc>
+                  <a:extLst>
+                    <a:ext uri="{0D108BD9-81ED-4DB2-BD59-A6C34878D82A}">
+                      <a16:rowId xmlns:a16="http://schemas.microsoft.com/office/drawing/2014/main" val="10005"/>
+                    </a:ext>
+                  </a:extLst>
                 </a:tr>
               </a:tbl>
             </a:graphicData>
@@ -8222,7 +8451,7 @@
             </a:ln>
             <a:extLst>
               <a:ext uri="{C572A759-6A51-4108-AA02-DFA0A04FC94B}">
-                <ma14:wrappingTextBoxFlag xmlns:ma14="http://schemas.microsoft.com/office/mac/drawingml/2011/main" xmlns="" val="1"/>
+                <ma14:wrappingTextBoxFlag xmlns="" xmlns:ma14="http://schemas.microsoft.com/office/mac/drawingml/2011/main" val="1"/>
               </a:ext>
             </a:extLst>
           </p:spPr>
@@ -8304,8 +8533,20 @@
                   <a:tableStyleId>{33BA23B1-9221-436E-865A-0063620EA4FD}</a:tableStyleId>
                 </a:tblPr>
                 <a:tblGrid>
-                  <a:gridCol w="976751"/>
-                  <a:gridCol w="2189770"/>
+                  <a:gridCol w="976751">
+                    <a:extLst>
+                      <a:ext uri="{9D8B030D-6E8A-4147-A177-3AD203B41FA5}">
+                        <a16:colId xmlns:a16="http://schemas.microsoft.com/office/drawing/2014/main" val="20000"/>
+                      </a:ext>
+                    </a:extLst>
+                  </a:gridCol>
+                  <a:gridCol w="2189770">
+                    <a:extLst>
+                      <a:ext uri="{9D8B030D-6E8A-4147-A177-3AD203B41FA5}">
+                        <a16:colId xmlns:a16="http://schemas.microsoft.com/office/drawing/2014/main" val="20001"/>
+                      </a:ext>
+                    </a:extLst>
+                  </a:gridCol>
                 </a:tblGrid>
                 <a:tr h="0">
                   <a:tc>
@@ -8460,6 +8701,11 @@
                       </a:solidFill>
                     </a:tcPr>
                   </a:tc>
+                  <a:extLst>
+                    <a:ext uri="{0D108BD9-81ED-4DB2-BD59-A6C34878D82A}">
+                      <a16:rowId xmlns:a16="http://schemas.microsoft.com/office/drawing/2014/main" val="10000"/>
+                    </a:ext>
+                  </a:extLst>
                 </a:tr>
                 <a:tr h="0">
                   <a:tc>
@@ -8547,6 +8793,11 @@
                       </a:solidFill>
                     </a:tcPr>
                   </a:tc>
+                  <a:extLst>
+                    <a:ext uri="{0D108BD9-81ED-4DB2-BD59-A6C34878D82A}">
+                      <a16:rowId xmlns:a16="http://schemas.microsoft.com/office/drawing/2014/main" val="10001"/>
+                    </a:ext>
+                  </a:extLst>
                 </a:tr>
                 <a:tr h="0">
                   <a:tc>
@@ -8652,6 +8903,11 @@
                       </a:solidFill>
                     </a:tcPr>
                   </a:tc>
+                  <a:extLst>
+                    <a:ext uri="{0D108BD9-81ED-4DB2-BD59-A6C34878D82A}">
+                      <a16:rowId xmlns:a16="http://schemas.microsoft.com/office/drawing/2014/main" val="10002"/>
+                    </a:ext>
+                  </a:extLst>
                 </a:tr>
                 <a:tr h="0">
                   <a:tc>
@@ -8794,6 +9050,11 @@
                       </a:solidFill>
                     </a:tcPr>
                   </a:tc>
+                  <a:extLst>
+                    <a:ext uri="{0D108BD9-81ED-4DB2-BD59-A6C34878D82A}">
+                      <a16:rowId xmlns:a16="http://schemas.microsoft.com/office/drawing/2014/main" val="10003"/>
+                    </a:ext>
+                  </a:extLst>
                 </a:tr>
                 <a:tr h="0">
                   <a:tc>
@@ -8899,6 +9160,11 @@
                       </a:solidFill>
                     </a:tcPr>
                   </a:tc>
+                  <a:extLst>
+                    <a:ext uri="{0D108BD9-81ED-4DB2-BD59-A6C34878D82A}">
+                      <a16:rowId xmlns:a16="http://schemas.microsoft.com/office/drawing/2014/main" val="10004"/>
+                    </a:ext>
+                  </a:extLst>
                 </a:tr>
                 <a:tr h="0">
                   <a:tc>
@@ -9008,6 +9274,11 @@
                       </a:solidFill>
                     </a:tcPr>
                   </a:tc>
+                  <a:extLst>
+                    <a:ext uri="{0D108BD9-81ED-4DB2-BD59-A6C34878D82A}">
+                      <a16:rowId xmlns:a16="http://schemas.microsoft.com/office/drawing/2014/main" val="10005"/>
+                    </a:ext>
+                  </a:extLst>
                 </a:tr>
                 <a:tr h="0">
                   <a:tc>
@@ -9091,6 +9362,11 @@
                       </a:solidFill>
                     </a:tcPr>
                   </a:tc>
+                  <a:extLst>
+                    <a:ext uri="{0D108BD9-81ED-4DB2-BD59-A6C34878D82A}">
+                      <a16:rowId xmlns:a16="http://schemas.microsoft.com/office/drawing/2014/main" val="10006"/>
+                    </a:ext>
+                  </a:extLst>
                 </a:tr>
                 <a:tr h="0">
                   <a:tc>
@@ -9163,6 +9439,11 @@
                       </a:solidFill>
                     </a:tcPr>
                   </a:tc>
+                  <a:extLst>
+                    <a:ext uri="{0D108BD9-81ED-4DB2-BD59-A6C34878D82A}">
+                      <a16:rowId xmlns:a16="http://schemas.microsoft.com/office/drawing/2014/main" val="10007"/>
+                    </a:ext>
+                  </a:extLst>
                 </a:tr>
                 <a:tr h="0">
                   <a:tc>
@@ -9332,6 +9613,11 @@
                       </a:solidFill>
                     </a:tcPr>
                   </a:tc>
+                  <a:extLst>
+                    <a:ext uri="{0D108BD9-81ED-4DB2-BD59-A6C34878D82A}">
+                      <a16:rowId xmlns:a16="http://schemas.microsoft.com/office/drawing/2014/main" val="10008"/>
+                    </a:ext>
+                  </a:extLst>
                 </a:tr>
                 <a:tr h="0">
                   <a:tc>
@@ -9404,6 +9690,11 @@
                       </a:solidFill>
                     </a:tcPr>
                   </a:tc>
+                  <a:extLst>
+                    <a:ext uri="{0D108BD9-81ED-4DB2-BD59-A6C34878D82A}">
+                      <a16:rowId xmlns:a16="http://schemas.microsoft.com/office/drawing/2014/main" val="10009"/>
+                    </a:ext>
+                  </a:extLst>
                 </a:tr>
                 <a:tr h="0">
                   <a:tc>
@@ -9593,6 +9884,11 @@
                       </a:solidFill>
                     </a:tcPr>
                   </a:tc>
+                  <a:extLst>
+                    <a:ext uri="{0D108BD9-81ED-4DB2-BD59-A6C34878D82A}">
+                      <a16:rowId xmlns:a16="http://schemas.microsoft.com/office/drawing/2014/main" val="10010"/>
+                    </a:ext>
+                  </a:extLst>
                 </a:tr>
                 <a:tr h="0">
                   <a:tc>
@@ -9680,6 +9976,11 @@
                       </a:solidFill>
                     </a:tcPr>
                   </a:tc>
+                  <a:extLst>
+                    <a:ext uri="{0D108BD9-81ED-4DB2-BD59-A6C34878D82A}">
+                      <a16:rowId xmlns:a16="http://schemas.microsoft.com/office/drawing/2014/main" val="10011"/>
+                    </a:ext>
+                  </a:extLst>
                 </a:tr>
                 <a:tr h="0">
                   <a:tc>
@@ -9801,6 +10102,11 @@
                       </a:solidFill>
                     </a:tcPr>
                   </a:tc>
+                  <a:extLst>
+                    <a:ext uri="{0D108BD9-81ED-4DB2-BD59-A6C34878D82A}">
+                      <a16:rowId xmlns:a16="http://schemas.microsoft.com/office/drawing/2014/main" val="10012"/>
+                    </a:ext>
+                  </a:extLst>
                 </a:tr>
                 <a:tr h="0">
                   <a:tc>
@@ -9967,6 +10273,11 @@
                       </a:solidFill>
                     </a:tcPr>
                   </a:tc>
+                  <a:extLst>
+                    <a:ext uri="{0D108BD9-81ED-4DB2-BD59-A6C34878D82A}">
+                      <a16:rowId xmlns:a16="http://schemas.microsoft.com/office/drawing/2014/main" val="10013"/>
+                    </a:ext>
+                  </a:extLst>
                 </a:tr>
                 <a:tr h="0">
                   <a:tc>
@@ -10142,6 +10453,11 @@
                       </a:solidFill>
                     </a:tcPr>
                   </a:tc>
+                  <a:extLst>
+                    <a:ext uri="{0D108BD9-81ED-4DB2-BD59-A6C34878D82A}">
+                      <a16:rowId xmlns:a16="http://schemas.microsoft.com/office/drawing/2014/main" val="10014"/>
+                    </a:ext>
+                  </a:extLst>
                 </a:tr>
                 <a:tr h="0">
                   <a:tc>
@@ -10322,6 +10638,11 @@
                       </a:solidFill>
                     </a:tcPr>
                   </a:tc>
+                  <a:extLst>
+                    <a:ext uri="{0D108BD9-81ED-4DB2-BD59-A6C34878D82A}">
+                      <a16:rowId xmlns:a16="http://schemas.microsoft.com/office/drawing/2014/main" val="10015"/>
+                    </a:ext>
+                  </a:extLst>
                 </a:tr>
               </a:tbl>
             </a:graphicData>
@@ -10407,7 +10728,7 @@
             </a:ln>
             <a:extLst>
               <a:ext uri="{C572A759-6A51-4108-AA02-DFA0A04FC94B}">
-                <ma14:wrappingTextBoxFlag xmlns:ma14="http://schemas.microsoft.com/office/mac/drawingml/2011/main" xmlns="" val="1"/>
+                <ma14:wrappingTextBoxFlag xmlns="" xmlns:ma14="http://schemas.microsoft.com/office/mac/drawingml/2011/main" val="1"/>
               </a:ext>
             </a:extLst>
           </p:spPr>
@@ -10525,8 +10846,20 @@
                   <a:tableStyleId>{33BA23B1-9221-436E-865A-0063620EA4FD}</a:tableStyleId>
                 </a:tblPr>
                 <a:tblGrid>
-                  <a:gridCol w="537703"/>
-                  <a:gridCol w="2628818"/>
+                  <a:gridCol w="537703">
+                    <a:extLst>
+                      <a:ext uri="{9D8B030D-6E8A-4147-A177-3AD203B41FA5}">
+                        <a16:colId xmlns:a16="http://schemas.microsoft.com/office/drawing/2014/main" val="20000"/>
+                      </a:ext>
+                    </a:extLst>
+                  </a:gridCol>
+                  <a:gridCol w="2628818">
+                    <a:extLst>
+                      <a:ext uri="{9D8B030D-6E8A-4147-A177-3AD203B41FA5}">
+                        <a16:colId xmlns:a16="http://schemas.microsoft.com/office/drawing/2014/main" val="20001"/>
+                      </a:ext>
+                    </a:extLst>
+                  </a:gridCol>
                 </a:tblGrid>
                 <a:tr h="0">
                   <a:tc>
@@ -10598,6 +10931,11 @@
                       </a:solidFill>
                     </a:tcPr>
                   </a:tc>
+                  <a:extLst>
+                    <a:ext uri="{0D108BD9-81ED-4DB2-BD59-A6C34878D82A}">
+                      <a16:rowId xmlns:a16="http://schemas.microsoft.com/office/drawing/2014/main" val="10000"/>
+                    </a:ext>
+                  </a:extLst>
                 </a:tr>
                 <a:tr h="0">
                   <a:tc>
@@ -10695,6 +11033,11 @@
                       </a:solidFill>
                     </a:tcPr>
                   </a:tc>
+                  <a:extLst>
+                    <a:ext uri="{0D108BD9-81ED-4DB2-BD59-A6C34878D82A}">
+                      <a16:rowId xmlns:a16="http://schemas.microsoft.com/office/drawing/2014/main" val="10001"/>
+                    </a:ext>
+                  </a:extLst>
                 </a:tr>
                 <a:tr h="0">
                   <a:tc>
@@ -10821,6 +11164,11 @@
                       </a:solidFill>
                     </a:tcPr>
                   </a:tc>
+                  <a:extLst>
+                    <a:ext uri="{0D108BD9-81ED-4DB2-BD59-A6C34878D82A}">
+                      <a16:rowId xmlns:a16="http://schemas.microsoft.com/office/drawing/2014/main" val="10002"/>
+                    </a:ext>
+                  </a:extLst>
                 </a:tr>
                 <a:tr h="0">
                   <a:tc>
@@ -10987,6 +11335,11 @@
                       </a:solidFill>
                     </a:tcPr>
                   </a:tc>
+                  <a:extLst>
+                    <a:ext uri="{0D108BD9-81ED-4DB2-BD59-A6C34878D82A}">
+                      <a16:rowId xmlns:a16="http://schemas.microsoft.com/office/drawing/2014/main" val="10003"/>
+                    </a:ext>
+                  </a:extLst>
                 </a:tr>
                 <a:tr h="0">
                   <a:tc>
@@ -11080,6 +11433,11 @@
                       </a:solidFill>
                     </a:tcPr>
                   </a:tc>
+                  <a:extLst>
+                    <a:ext uri="{0D108BD9-81ED-4DB2-BD59-A6C34878D82A}">
+                      <a16:rowId xmlns:a16="http://schemas.microsoft.com/office/drawing/2014/main" val="10004"/>
+                    </a:ext>
+                  </a:extLst>
                 </a:tr>
                 <a:tr h="0">
                   <a:tc>
@@ -11235,6 +11593,11 @@
                       </a:solidFill>
                     </a:tcPr>
                   </a:tc>
+                  <a:extLst>
+                    <a:ext uri="{0D108BD9-81ED-4DB2-BD59-A6C34878D82A}">
+                      <a16:rowId xmlns:a16="http://schemas.microsoft.com/office/drawing/2014/main" val="10005"/>
+                    </a:ext>
+                  </a:extLst>
                 </a:tr>
               </a:tbl>
             </a:graphicData>
@@ -11320,7 +11683,7 @@
             </a:ln>
             <a:extLst>
               <a:ext uri="{C572A759-6A51-4108-AA02-DFA0A04FC94B}">
-                <ma14:wrappingTextBoxFlag xmlns:ma14="http://schemas.microsoft.com/office/mac/drawingml/2011/main" xmlns="" val="1"/>
+                <ma14:wrappingTextBoxFlag xmlns="" xmlns:ma14="http://schemas.microsoft.com/office/mac/drawingml/2011/main" val="1"/>
               </a:ext>
             </a:extLst>
           </p:spPr>
@@ -11390,8 +11753,20 @@
                   <a:tableStyleId>{33BA23B1-9221-436E-865A-0063620EA4FD}</a:tableStyleId>
                 </a:tblPr>
                 <a:tblGrid>
-                  <a:gridCol w="537703"/>
-                  <a:gridCol w="2628818"/>
+                  <a:gridCol w="537703">
+                    <a:extLst>
+                      <a:ext uri="{9D8B030D-6E8A-4147-A177-3AD203B41FA5}">
+                        <a16:colId xmlns:a16="http://schemas.microsoft.com/office/drawing/2014/main" val="20000"/>
+                      </a:ext>
+                    </a:extLst>
+                  </a:gridCol>
+                  <a:gridCol w="2628818">
+                    <a:extLst>
+                      <a:ext uri="{9D8B030D-6E8A-4147-A177-3AD203B41FA5}">
+                        <a16:colId xmlns:a16="http://schemas.microsoft.com/office/drawing/2014/main" val="20001"/>
+                      </a:ext>
+                    </a:extLst>
+                  </a:gridCol>
                 </a:tblGrid>
                 <a:tr h="0">
                   <a:tc>
@@ -11460,6 +11835,11 @@
                       </a:solidFill>
                     </a:tcPr>
                   </a:tc>
+                  <a:extLst>
+                    <a:ext uri="{0D108BD9-81ED-4DB2-BD59-A6C34878D82A}">
+                      <a16:rowId xmlns:a16="http://schemas.microsoft.com/office/drawing/2014/main" val="10000"/>
+                    </a:ext>
+                  </a:extLst>
                 </a:tr>
                 <a:tr h="0">
                   <a:tc>
@@ -11532,6 +11912,11 @@
                       </a:solidFill>
                     </a:tcPr>
                   </a:tc>
+                  <a:extLst>
+                    <a:ext uri="{0D108BD9-81ED-4DB2-BD59-A6C34878D82A}">
+                      <a16:rowId xmlns:a16="http://schemas.microsoft.com/office/drawing/2014/main" val="10001"/>
+                    </a:ext>
+                  </a:extLst>
                 </a:tr>
                 <a:tr h="0">
                   <a:tc>
@@ -11600,6 +11985,11 @@
                       </a:solidFill>
                     </a:tcPr>
                   </a:tc>
+                  <a:extLst>
+                    <a:ext uri="{0D108BD9-81ED-4DB2-BD59-A6C34878D82A}">
+                      <a16:rowId xmlns:a16="http://schemas.microsoft.com/office/drawing/2014/main" val="10002"/>
+                    </a:ext>
+                  </a:extLst>
                 </a:tr>
                 <a:tr h="0">
                   <a:tc>
@@ -11694,6 +12084,11 @@
                       </a:solidFill>
                     </a:tcPr>
                   </a:tc>
+                  <a:extLst>
+                    <a:ext uri="{0D108BD9-81ED-4DB2-BD59-A6C34878D82A}">
+                      <a16:rowId xmlns:a16="http://schemas.microsoft.com/office/drawing/2014/main" val="10003"/>
+                    </a:ext>
+                  </a:extLst>
                 </a:tr>
                 <a:tr h="0">
                   <a:tc>
@@ -11762,6 +12157,11 @@
                       </a:solidFill>
                     </a:tcPr>
                   </a:tc>
+                  <a:extLst>
+                    <a:ext uri="{0D108BD9-81ED-4DB2-BD59-A6C34878D82A}">
+                      <a16:rowId xmlns:a16="http://schemas.microsoft.com/office/drawing/2014/main" val="10004"/>
+                    </a:ext>
+                  </a:extLst>
                 </a:tr>
               </a:tbl>
             </a:graphicData>
@@ -11847,7 +12247,7 @@
             </a:ln>
             <a:extLst>
               <a:ext uri="{C572A759-6A51-4108-AA02-DFA0A04FC94B}">
-                <ma14:wrappingTextBoxFlag xmlns:ma14="http://schemas.microsoft.com/office/mac/drawingml/2011/main" xmlns="" val="1"/>
+                <ma14:wrappingTextBoxFlag xmlns="" xmlns:ma14="http://schemas.microsoft.com/office/mac/drawingml/2011/main" val="1"/>
               </a:ext>
             </a:extLst>
           </p:spPr>
@@ -11965,8 +12365,20 @@
                   <a:tableStyleId>{33BA23B1-9221-436E-865A-0063620EA4FD}</a:tableStyleId>
                 </a:tblPr>
                 <a:tblGrid>
-                  <a:gridCol w="825435"/>
-                  <a:gridCol w="2341086"/>
+                  <a:gridCol w="825435">
+                    <a:extLst>
+                      <a:ext uri="{9D8B030D-6E8A-4147-A177-3AD203B41FA5}">
+                        <a16:colId xmlns:a16="http://schemas.microsoft.com/office/drawing/2014/main" val="20000"/>
+                      </a:ext>
+                    </a:extLst>
+                  </a:gridCol>
+                  <a:gridCol w="2341086">
+                    <a:extLst>
+                      <a:ext uri="{9D8B030D-6E8A-4147-A177-3AD203B41FA5}">
+                        <a16:colId xmlns:a16="http://schemas.microsoft.com/office/drawing/2014/main" val="20001"/>
+                      </a:ext>
+                    </a:extLst>
+                  </a:gridCol>
                 </a:tblGrid>
                 <a:tr h="0">
                   <a:tc>
@@ -12142,6 +12554,11 @@
                       </a:solidFill>
                     </a:tcPr>
                   </a:tc>
+                  <a:extLst>
+                    <a:ext uri="{0D108BD9-81ED-4DB2-BD59-A6C34878D82A}">
+                      <a16:rowId xmlns:a16="http://schemas.microsoft.com/office/drawing/2014/main" val="10000"/>
+                    </a:ext>
+                  </a:extLst>
                 </a:tr>
                 <a:tr h="0">
                   <a:tc>
@@ -12239,6 +12656,11 @@
                       </a:solidFill>
                     </a:tcPr>
                   </a:tc>
+                  <a:extLst>
+                    <a:ext uri="{0D108BD9-81ED-4DB2-BD59-A6C34878D82A}">
+                      <a16:rowId xmlns:a16="http://schemas.microsoft.com/office/drawing/2014/main" val="10001"/>
+                    </a:ext>
+                  </a:extLst>
                 </a:tr>
                 <a:tr h="0">
                   <a:tc>
@@ -12414,6 +12836,11 @@
                       </a:solidFill>
                     </a:tcPr>
                   </a:tc>
+                  <a:extLst>
+                    <a:ext uri="{0D108BD9-81ED-4DB2-BD59-A6C34878D82A}">
+                      <a16:rowId xmlns:a16="http://schemas.microsoft.com/office/drawing/2014/main" val="10002"/>
+                    </a:ext>
+                  </a:extLst>
                 </a:tr>
                 <a:tr h="0">
                   <a:tc>
@@ -12577,6 +13004,11 @@
                       </a:solidFill>
                     </a:tcPr>
                   </a:tc>
+                  <a:extLst>
+                    <a:ext uri="{0D108BD9-81ED-4DB2-BD59-A6C34878D82A}">
+                      <a16:rowId xmlns:a16="http://schemas.microsoft.com/office/drawing/2014/main" val="10003"/>
+                    </a:ext>
+                  </a:extLst>
                 </a:tr>
                 <a:tr h="0">
                   <a:tc>
@@ -12767,6 +13199,11 @@
                       </a:solidFill>
                     </a:tcPr>
                   </a:tc>
+                  <a:extLst>
+                    <a:ext uri="{0D108BD9-81ED-4DB2-BD59-A6C34878D82A}">
+                      <a16:rowId xmlns:a16="http://schemas.microsoft.com/office/drawing/2014/main" val="10004"/>
+                    </a:ext>
+                  </a:extLst>
                 </a:tr>
                 <a:tr h="0">
                   <a:tc>
@@ -12928,6 +13365,11 @@
                       </a:solidFill>
                     </a:tcPr>
                   </a:tc>
+                  <a:extLst>
+                    <a:ext uri="{0D108BD9-81ED-4DB2-BD59-A6C34878D82A}">
+                      <a16:rowId xmlns:a16="http://schemas.microsoft.com/office/drawing/2014/main" val="10005"/>
+                    </a:ext>
+                  </a:extLst>
                 </a:tr>
               </a:tbl>
             </a:graphicData>
@@ -13991,7 +14433,7 @@
                 <a:latin typeface="Consolas" panose="020B0609020204030204" pitchFamily="49" charset="0"/>
                 <a:cs typeface="Consolas" panose="020B0609020204030204" pitchFamily="49" charset="0"/>
               </a:rPr>
-              <a:t>ignore.cases</a:t>
+              <a:t>ignore.case</a:t>
             </a:r>
             <a:r>
               <a:rPr lang="de-DE" sz="1100" dirty="0" smtClean="0">
@@ -14001,7 +14443,17 @@
                 <a:latin typeface="Consolas" panose="020B0609020204030204" pitchFamily="49" charset="0"/>
                 <a:cs typeface="Consolas" panose="020B0609020204030204" pitchFamily="49" charset="0"/>
               </a:rPr>
-              <a:t> = TRUE</a:t>
+              <a:t> </a:t>
+            </a:r>
+            <a:r>
+              <a:rPr lang="de-DE" sz="1100" dirty="0" smtClean="0">
+                <a:solidFill>
+                  <a:schemeClr val="tx1"/>
+                </a:solidFill>
+                <a:latin typeface="Consolas" panose="020B0609020204030204" pitchFamily="49" charset="0"/>
+                <a:cs typeface="Consolas" panose="020B0609020204030204" pitchFamily="49" charset="0"/>
+              </a:rPr>
+              <a:t>= TRUE</a:t>
             </a:r>
             <a:r>
               <a:rPr lang="de-DE" sz="1100" dirty="0" smtClean="0">
@@ -16795,7 +17247,7 @@
           </a:ln>
           <a:extLst>
             <a:ext uri="{C572A759-6A51-4108-AA02-DFA0A04FC94B}">
-              <ma14:wrappingTextBoxFlag xmlns:ma14="http://schemas.microsoft.com/office/mac/drawingml/2011/main" xmlns="" val="1"/>
+              <ma14:wrappingTextBoxFlag xmlns="" xmlns:ma14="http://schemas.microsoft.com/office/mac/drawingml/2011/main" val="1"/>
             </a:ext>
           </a:extLst>
         </p:spPr>
@@ -17341,23 +17793,7 @@
                 <a:cs typeface="Helvetica" panose="020B0604020202020204" pitchFamily="34" charset="0"/>
                 <a:sym typeface="Helvetica Light"/>
               </a:rPr>
-              <a:t> </a:t>
-            </a:r>
-            <a:r>
-              <a:rPr kumimoji="0" lang="de-DE" sz="1100" i="0" u="none" strike="noStrike" cap="none" spc="0" normalizeH="0" dirty="0" smtClean="0">
-                <a:ln>
-                  <a:noFill/>
-                </a:ln>
-                <a:solidFill>
-                  <a:srgbClr val="000000"/>
-                </a:solidFill>
-                <a:effectLst/>
-                <a:uFillTx/>
-                <a:ea typeface="Adobe Gothic Std B" pitchFamily="34" charset="-128"/>
-                <a:cs typeface="Helvetica" panose="020B0604020202020204" pitchFamily="34" charset="0"/>
-                <a:sym typeface="Helvetica Light"/>
-              </a:rPr>
-              <a:t>e.g. </a:t>
+              <a:t> e.g. </a:t>
             </a:r>
             <a:r>
               <a:rPr kumimoji="0" lang="de-DE" sz="1100" i="0" u="none" strike="noStrike" cap="none" spc="0" normalizeH="0" dirty="0" err="1" smtClean="0">

</xml_diff>